<commit_message>
Docs: se corrigen nombres de integrantes
</commit_message>
<xml_diff>
--- a/PROYECTO V7.pptx
+++ b/PROYECTO V7.pptx
@@ -1606,7 +1606,7 @@
           </a:ln>
           <a:extLst>
             <a:ext uri="{C572A759-6A51-4108-AA02-DFA0A04FC94B}">
-              <ma14:wrappingTextBoxFlag xmlns="" xmlns:ma14="http://schemas.microsoft.com/office/mac/drawingml/2011/main" val="1"/>
+              <ma14:wrappingTextBoxFlag xmlns:ma14="http://schemas.microsoft.com/office/mac/drawingml/2011/main" xmlns="" val="1"/>
             </a:ext>
           </a:extLst>
         </p:spPr>
@@ -1669,7 +1669,7 @@
           </a:ln>
           <a:extLst>
             <a:ext uri="{C572A759-6A51-4108-AA02-DFA0A04FC94B}">
-              <ma14:wrappingTextBoxFlag xmlns="" xmlns:ma14="http://schemas.microsoft.com/office/mac/drawingml/2011/main" val="1"/>
+              <ma14:wrappingTextBoxFlag xmlns:ma14="http://schemas.microsoft.com/office/mac/drawingml/2011/main" xmlns="" val="1"/>
             </a:ext>
           </a:extLst>
         </p:spPr>
@@ -2632,13 +2632,6 @@
     <a:masterClrMapping/>
   </p:clrMapOvr>
   <p:transition spd="med"/>
-  <p:timing>
-    <p:tnLst>
-      <p:par>
-        <p:cTn id="1" dur="indefinite" restart="never" nodeType="tmRoot"/>
-      </p:par>
-    </p:tnLst>
-  </p:timing>
 </p:sld>
 </file>
 
@@ -2836,13 +2829,6 @@
     <a:masterClrMapping/>
   </p:clrMapOvr>
   <p:transition spd="med"/>
-  <p:timing>
-    <p:tnLst>
-      <p:par>
-        <p:cTn id="1" dur="indefinite" restart="never" nodeType="tmRoot"/>
-      </p:par>
-    </p:tnLst>
-  </p:timing>
 </p:sld>
 </file>
 
@@ -3165,13 +3151,6 @@
     <a:masterClrMapping/>
   </p:clrMapOvr>
   <p:transition spd="med"/>
-  <p:timing>
-    <p:tnLst>
-      <p:par>
-        <p:cTn id="1" dur="indefinite" restart="never" nodeType="tmRoot"/>
-      </p:par>
-    </p:tnLst>
-  </p:timing>
 </p:sld>
 </file>
 
@@ -3364,13 +3343,6 @@
     <a:masterClrMapping/>
   </p:clrMapOvr>
   <p:transition spd="med"/>
-  <p:timing>
-    <p:tnLst>
-      <p:par>
-        <p:cTn id="1" dur="indefinite" restart="never" nodeType="tmRoot"/>
-      </p:par>
-    </p:tnLst>
-  </p:timing>
 </p:sld>
 </file>
 
@@ -3519,13 +3491,6 @@
     <a:masterClrMapping/>
   </p:clrMapOvr>
   <p:transition spd="med"/>
-  <p:timing>
-    <p:tnLst>
-      <p:par>
-        <p:cTn id="1" dur="indefinite" restart="never" nodeType="tmRoot"/>
-      </p:par>
-    </p:tnLst>
-  </p:timing>
 </p:sld>
 </file>
 
@@ -3677,13 +3642,6 @@
     <a:masterClrMapping/>
   </p:clrMapOvr>
   <p:transition spd="med"/>
-  <p:timing>
-    <p:tnLst>
-      <p:par>
-        <p:cTn id="1" dur="indefinite" restart="never" nodeType="tmRoot"/>
-      </p:par>
-    </p:tnLst>
-  </p:timing>
 </p:sld>
 </file>
 
@@ -3841,13 +3799,6 @@
     <a:masterClrMapping/>
   </p:clrMapOvr>
   <p:transition spd="med"/>
-  <p:timing>
-    <p:tnLst>
-      <p:par>
-        <p:cTn id="1" dur="indefinite" restart="never" nodeType="tmRoot"/>
-      </p:par>
-    </p:tnLst>
-  </p:timing>
 </p:sld>
 </file>
 
@@ -3951,13 +3902,6 @@
     <a:masterClrMapping/>
   </p:clrMapOvr>
   <p:transition spd="med"/>
-  <p:timing>
-    <p:tnLst>
-      <p:par>
-        <p:cTn id="1" dur="indefinite" restart="never" nodeType="tmRoot"/>
-      </p:par>
-    </p:tnLst>
-  </p:timing>
 </p:sld>
 </file>
 
@@ -4027,13 +3971,6 @@
     <a:masterClrMapping/>
   </p:clrMapOvr>
   <p:transition spd="med"/>
-  <p:timing>
-    <p:tnLst>
-      <p:par>
-        <p:cTn id="1" dur="indefinite" restart="never" nodeType="tmRoot"/>
-      </p:par>
-    </p:tnLst>
-  </p:timing>
 </p:sld>
 </file>
 
@@ -4103,13 +4040,6 @@
     <a:masterClrMapping/>
   </p:clrMapOvr>
   <p:transition spd="med"/>
-  <p:timing>
-    <p:tnLst>
-      <p:par>
-        <p:cTn id="1" dur="indefinite" restart="never" nodeType="tmRoot"/>
-      </p:par>
-    </p:tnLst>
-  </p:timing>
 </p:sld>
 </file>
 
@@ -4179,13 +4109,6 @@
     <a:masterClrMapping/>
   </p:clrMapOvr>
   <p:transition spd="med"/>
-  <p:timing>
-    <p:tnLst>
-      <p:par>
-        <p:cTn id="1" dur="indefinite" restart="never" nodeType="tmRoot"/>
-      </p:par>
-    </p:tnLst>
-  </p:timing>
 </p:sld>
 </file>
 
@@ -4445,13 +4368,6 @@
     <a:masterClrMapping/>
   </p:clrMapOvr>
   <p:transition spd="med"/>
-  <p:timing>
-    <p:tnLst>
-      <p:par>
-        <p:cTn id="1" dur="indefinite" restart="never" nodeType="tmRoot"/>
-      </p:par>
-    </p:tnLst>
-  </p:timing>
 </p:sld>
 </file>
 
@@ -4555,13 +4471,6 @@
     <a:masterClrMapping/>
   </p:clrMapOvr>
   <p:transition spd="med"/>
-  <p:timing>
-    <p:tnLst>
-      <p:par>
-        <p:cTn id="1" dur="indefinite" restart="never" nodeType="tmRoot"/>
-      </p:par>
-    </p:tnLst>
-  </p:timing>
 </p:sld>
 </file>
 
@@ -4631,13 +4540,6 @@
     <a:masterClrMapping/>
   </p:clrMapOvr>
   <p:transition spd="med"/>
-  <p:timing>
-    <p:tnLst>
-      <p:par>
-        <p:cTn id="1" dur="indefinite" restart="never" nodeType="tmRoot"/>
-      </p:par>
-    </p:tnLst>
-  </p:timing>
 </p:sld>
 </file>
 
@@ -4707,13 +4609,6 @@
     <a:masterClrMapping/>
   </p:clrMapOvr>
   <p:transition spd="med"/>
-  <p:timing>
-    <p:tnLst>
-      <p:par>
-        <p:cTn id="1" dur="indefinite" restart="never" nodeType="tmRoot"/>
-      </p:par>
-    </p:tnLst>
-  </p:timing>
 </p:sld>
 </file>
 
@@ -4783,13 +4678,6 @@
     <a:masterClrMapping/>
   </p:clrMapOvr>
   <p:transition spd="med"/>
-  <p:timing>
-    <p:tnLst>
-      <p:par>
-        <p:cTn id="1" dur="indefinite" restart="never" nodeType="tmRoot"/>
-      </p:par>
-    </p:tnLst>
-  </p:timing>
 </p:sld>
 </file>
 
@@ -4907,13 +4795,6 @@
     <a:masterClrMapping/>
   </p:clrMapOvr>
   <p:transition spd="med"/>
-  <p:timing>
-    <p:tnLst>
-      <p:par>
-        <p:cTn id="1" dur="indefinite" restart="never" nodeType="tmRoot"/>
-      </p:par>
-    </p:tnLst>
-  </p:timing>
 </p:sld>
 </file>
 
@@ -4983,13 +4864,6 @@
     <a:masterClrMapping/>
   </p:clrMapOvr>
   <p:transition spd="med"/>
-  <p:timing>
-    <p:tnLst>
-      <p:par>
-        <p:cTn id="1" dur="indefinite" restart="never" nodeType="tmRoot"/>
-      </p:par>
-    </p:tnLst>
-  </p:timing>
 </p:sld>
 </file>
 
@@ -5059,13 +4933,6 @@
     <a:masterClrMapping/>
   </p:clrMapOvr>
   <p:transition spd="med"/>
-  <p:timing>
-    <p:tnLst>
-      <p:par>
-        <p:cTn id="1" dur="indefinite" restart="never" nodeType="tmRoot"/>
-      </p:par>
-    </p:tnLst>
-  </p:timing>
 </p:sld>
 </file>
 
@@ -5169,13 +5036,6 @@
     <a:masterClrMapping/>
   </p:clrMapOvr>
   <p:transition spd="med"/>
-  <p:timing>
-    <p:tnLst>
-      <p:par>
-        <p:cTn id="1" dur="indefinite" restart="never" nodeType="tmRoot"/>
-      </p:par>
-    </p:tnLst>
-  </p:timing>
 </p:sld>
 </file>
 
@@ -5245,13 +5105,6 @@
     <a:masterClrMapping/>
   </p:clrMapOvr>
   <p:transition spd="med"/>
-  <p:timing>
-    <p:tnLst>
-      <p:par>
-        <p:cTn id="1" dur="indefinite" restart="never" nodeType="tmRoot"/>
-      </p:par>
-    </p:tnLst>
-  </p:timing>
 </p:sld>
 </file>
 
@@ -5321,13 +5174,6 @@
     <a:masterClrMapping/>
   </p:clrMapOvr>
   <p:transition spd="med"/>
-  <p:timing>
-    <p:tnLst>
-      <p:par>
-        <p:cTn id="1" dur="indefinite" restart="never" nodeType="tmRoot"/>
-      </p:par>
-    </p:tnLst>
-  </p:timing>
 </p:sld>
 </file>
 
@@ -5466,27 +5312,7 @@
                 <a:latin typeface="Arial" panose="020B0604020202020204" pitchFamily="34" charset="0"/>
                 <a:cs typeface="Arial" panose="020B0604020202020204" pitchFamily="34" charset="0"/>
               </a:rPr>
-              <a:t>1. </a:t>
-            </a:r>
-            <a:r>
-              <a:rPr lang="es-CO" sz="5400" dirty="0" smtClean="0">
-                <a:solidFill>
-                  <a:schemeClr val="bg1"/>
-                </a:solidFill>
-                <a:latin typeface="Arial" panose="020B0604020202020204" pitchFamily="34" charset="0"/>
-                <a:cs typeface="Arial" panose="020B0604020202020204" pitchFamily="34" charset="0"/>
-              </a:rPr>
-              <a:t>Planteamiento </a:t>
-            </a:r>
-            <a:r>
-              <a:rPr lang="es-CO" sz="5400" dirty="0">
-                <a:solidFill>
-                  <a:schemeClr val="bg1"/>
-                </a:solidFill>
-                <a:latin typeface="Arial" panose="020B0604020202020204" pitchFamily="34" charset="0"/>
-                <a:cs typeface="Arial" panose="020B0604020202020204" pitchFamily="34" charset="0"/>
-              </a:rPr>
-              <a:t>del  problema </a:t>
+              <a:t>1. Planteamiento del  problema </a:t>
             </a:r>
           </a:p>
         </p:txBody>
@@ -5502,13 +5328,6 @@
     <a:masterClrMapping/>
   </p:clrMapOvr>
   <p:transition spd="med"/>
-  <p:timing>
-    <p:tnLst>
-      <p:par>
-        <p:cTn id="1" dur="indefinite" restart="never" nodeType="tmRoot"/>
-      </p:par>
-    </p:tnLst>
-  </p:timing>
 </p:sld>
 </file>
 
@@ -5578,13 +5397,6 @@
     <a:masterClrMapping/>
   </p:clrMapOvr>
   <p:transition spd="med"/>
-  <p:timing>
-    <p:tnLst>
-      <p:par>
-        <p:cTn id="1" dur="indefinite" restart="never" nodeType="tmRoot"/>
-      </p:par>
-    </p:tnLst>
-  </p:timing>
 </p:sld>
 </file>
 
@@ -5654,13 +5466,6 @@
     <a:masterClrMapping/>
   </p:clrMapOvr>
   <p:transition spd="med"/>
-  <p:timing>
-    <p:tnLst>
-      <p:par>
-        <p:cTn id="1" dur="indefinite" restart="never" nodeType="tmRoot"/>
-      </p:par>
-    </p:tnLst>
-  </p:timing>
 </p:sld>
 </file>
 
@@ -5769,7 +5574,7 @@
           <p:cNvPr id="4" name="Imagen 3">
             <a:extLst>
               <a:ext uri="{FF2B5EF4-FFF2-40B4-BE49-F238E27FC236}">
-                <a16:creationId xmlns="" xmlns:a16="http://schemas.microsoft.com/office/drawing/2014/main" id="{F1831477-7347-4378-9D4A-5CD618743F9E}"/>
+                <a16:creationId xmlns:a16="http://schemas.microsoft.com/office/drawing/2014/main" id="{F1831477-7347-4378-9D4A-5CD618743F9E}"/>
               </a:ext>
             </a:extLst>
           </p:cNvPr>
@@ -5805,13 +5610,6 @@
     <a:masterClrMapping/>
   </p:clrMapOvr>
   <p:transition spd="med"/>
-  <p:timing>
-    <p:tnLst>
-      <p:par>
-        <p:cTn id="1" dur="indefinite" restart="never" nodeType="tmRoot"/>
-      </p:par>
-    </p:tnLst>
-  </p:timing>
 </p:sld>
 </file>
 
@@ -5865,24 +5663,14 @@
           <a:lstStyle/>
           <a:p>
             <a:r>
-              <a:rPr lang="es-CO" sz="4400" dirty="0" smtClean="0">
+              <a:rPr lang="es-CO" sz="4400" dirty="0">
                 <a:solidFill>
                   <a:schemeClr val="bg1"/>
                 </a:solidFill>
                 <a:latin typeface="Arial" panose="020B0604020202020204" pitchFamily="34" charset="0"/>
                 <a:cs typeface="Arial" panose="020B0604020202020204" pitchFamily="34" charset="0"/>
               </a:rPr>
-              <a:t>Diagrama </a:t>
-            </a:r>
-            <a:r>
-              <a:rPr lang="es-CO" sz="4400" dirty="0">
-                <a:solidFill>
-                  <a:schemeClr val="bg1"/>
-                </a:solidFill>
-                <a:latin typeface="Arial" panose="020B0604020202020204" pitchFamily="34" charset="0"/>
-                <a:cs typeface="Arial" panose="020B0604020202020204" pitchFamily="34" charset="0"/>
-              </a:rPr>
-              <a:t>de clases </a:t>
+              <a:t>Diagrama de clases </a:t>
             </a:r>
           </a:p>
         </p:txBody>
@@ -6033,13 +5821,6 @@
     <a:masterClrMapping/>
   </p:clrMapOvr>
   <p:transition spd="med"/>
-  <p:timing>
-    <p:tnLst>
-      <p:par>
-        <p:cTn id="1" dur="indefinite" restart="never" nodeType="tmRoot"/>
-      </p:par>
-    </p:tnLst>
-  </p:timing>
 </p:sld>
 </file>
 
@@ -6198,13 +5979,6 @@
     <a:masterClrMapping/>
   </p:clrMapOvr>
   <p:transition spd="med"/>
-  <p:timing>
-    <p:tnLst>
-      <p:par>
-        <p:cTn id="1" dur="indefinite" restart="never" nodeType="tmRoot"/>
-      </p:par>
-    </p:tnLst>
-  </p:timing>
 </p:sld>
 </file>
 
@@ -6241,7 +6015,7 @@
           <p:cNvPr id="2" name="Rectángulo 1">
             <a:extLst>
               <a:ext uri="{FF2B5EF4-FFF2-40B4-BE49-F238E27FC236}">
-                <a16:creationId xmlns="" xmlns:a16="http://schemas.microsoft.com/office/drawing/2014/main" id="{6851ACCE-4682-46D5-88DE-76FEE70F5842}"/>
+                <a16:creationId xmlns:a16="http://schemas.microsoft.com/office/drawing/2014/main" id="{6851ACCE-4682-46D5-88DE-76FEE70F5842}"/>
               </a:ext>
             </a:extLst>
           </p:cNvPr>
@@ -6374,13 +6148,6 @@
               </a:rPr>
               <a:t>13. Equipo de trabajo :</a:t>
             </a:r>
-            <a:endParaRPr lang="es-CO" dirty="0">
-              <a:solidFill>
-                <a:schemeClr val="bg1"/>
-              </a:solidFill>
-              <a:latin typeface="Arial" panose="020B0604020202020204" pitchFamily="34" charset="0"/>
-              <a:cs typeface="Arial" panose="020B0604020202020204" pitchFamily="34" charset="0"/>
-            </a:endParaRPr>
           </a:p>
         </p:txBody>
       </p:sp>
@@ -6439,7 +6206,7 @@
               <a:t>Laura </a:t>
             </a:r>
             <a:r>
-              <a:rPr lang="es-CO" sz="4400" b="1" i="0" u="none" strike="noStrike" cap="none" dirty="0" err="1">
+              <a:rPr lang="es-CO" sz="4400" b="1" i="0" u="none" strike="noStrike" cap="none">
                 <a:solidFill>
                   <a:schemeClr val="dk1"/>
                 </a:solidFill>
@@ -6448,7 +6215,7 @@
                 <a:cs typeface="Arial" panose="020B0604020202020204" pitchFamily="34" charset="0"/>
                 <a:sym typeface="Barlow"/>
               </a:rPr>
-              <a:t>Khaterine</a:t>
+              <a:t>Katerine</a:t>
             </a:r>
             <a:r>
               <a:rPr lang="es-CO" sz="4400" b="1" i="0" u="none" strike="noStrike" cap="none" dirty="0">
@@ -6461,18 +6228,6 @@
                 <a:sym typeface="Barlow"/>
               </a:rPr>
               <a:t> Moreno</a:t>
-            </a:r>
-            <a:r>
-              <a:rPr lang="es-CO" sz="4800" b="0" i="0" u="none" strike="noStrike" cap="none" dirty="0">
-                <a:solidFill>
-                  <a:srgbClr val="000000"/>
-                </a:solidFill>
-                <a:latin typeface="Arial" panose="020B0604020202020204" pitchFamily="34" charset="0"/>
-                <a:ea typeface="Barlow"/>
-                <a:cs typeface="Arial" panose="020B0604020202020204" pitchFamily="34" charset="0"/>
-                <a:sym typeface="Barlow"/>
-              </a:rPr>
-              <a:t/>
             </a:r>
             <a:br>
               <a:rPr lang="es-CO" sz="4800" b="0" i="0" u="none" strike="noStrike" cap="none" dirty="0">
@@ -6655,18 +6410,6 @@
               </a:rPr>
               <a:t> Mayorga</a:t>
             </a:r>
-            <a:r>
-              <a:rPr lang="es-CO" sz="4800" b="0" i="0" u="none" strike="noStrike" cap="none" dirty="0">
-                <a:solidFill>
-                  <a:srgbClr val="000000"/>
-                </a:solidFill>
-                <a:latin typeface="Arial" panose="020B0604020202020204" pitchFamily="34" charset="0"/>
-                <a:ea typeface="Barlow"/>
-                <a:cs typeface="Arial" panose="020B0604020202020204" pitchFamily="34" charset="0"/>
-                <a:sym typeface="Barlow"/>
-              </a:rPr>
-              <a:t/>
-            </a:r>
             <a:br>
               <a:rPr lang="es-CO" sz="4800" b="0" i="0" u="none" strike="noStrike" cap="none" dirty="0">
                 <a:solidFill>
@@ -6808,7 +6551,7 @@
               <a:buNone/>
             </a:pPr>
             <a:r>
-              <a:rPr lang="es-CO" sz="4000" b="1" i="0" u="none" strike="noStrike" cap="none" dirty="0" err="1">
+              <a:rPr lang="es-CO" sz="4000" b="1" i="0" u="none" strike="noStrike" cap="none" dirty="0">
                 <a:solidFill>
                   <a:schemeClr val="dk1"/>
                 </a:solidFill>
@@ -6817,67 +6560,7 @@
                 <a:cs typeface="Arial" panose="020B0604020202020204" pitchFamily="34" charset="0"/>
                 <a:sym typeface="Barlow"/>
               </a:rPr>
-              <a:t>Jhony</a:t>
-            </a:r>
-            <a:r>
-              <a:rPr lang="es-CO" sz="4000" b="1" i="0" u="none" strike="noStrike" cap="none" dirty="0">
-                <a:solidFill>
-                  <a:schemeClr val="dk1"/>
-                </a:solidFill>
-                <a:latin typeface="Arial" panose="020B0604020202020204" pitchFamily="34" charset="0"/>
-                <a:ea typeface="Barlow"/>
-                <a:cs typeface="Arial" panose="020B0604020202020204" pitchFamily="34" charset="0"/>
-                <a:sym typeface="Barlow"/>
-              </a:rPr>
-              <a:t> </a:t>
-            </a:r>
-            <a:r>
-              <a:rPr lang="es-CO" sz="4000" b="1" i="0" u="none" strike="noStrike" cap="none" dirty="0" err="1">
-                <a:solidFill>
-                  <a:schemeClr val="dk1"/>
-                </a:solidFill>
-                <a:latin typeface="Arial" panose="020B0604020202020204" pitchFamily="34" charset="0"/>
-                <a:ea typeface="Barlow"/>
-                <a:cs typeface="Arial" panose="020B0604020202020204" pitchFamily="34" charset="0"/>
-                <a:sym typeface="Barlow"/>
-              </a:rPr>
-              <a:t>alexander</a:t>
-            </a:r>
-            <a:r>
-              <a:rPr lang="es-CO" sz="4000" b="1" i="0" u="none" strike="noStrike" cap="none" dirty="0">
-                <a:solidFill>
-                  <a:schemeClr val="dk1"/>
-                </a:solidFill>
-                <a:latin typeface="Arial" panose="020B0604020202020204" pitchFamily="34" charset="0"/>
-                <a:ea typeface="Barlow"/>
-                <a:cs typeface="Arial" panose="020B0604020202020204" pitchFamily="34" charset="0"/>
-                <a:sym typeface="Barlow"/>
-              </a:rPr>
-              <a:t> </a:t>
-            </a:r>
-            <a:r>
-              <a:rPr lang="es-CO" sz="4000" b="1" i="0" u="none" strike="noStrike" cap="none" dirty="0" err="1">
-                <a:solidFill>
-                  <a:schemeClr val="dk1"/>
-                </a:solidFill>
-                <a:latin typeface="Arial" panose="020B0604020202020204" pitchFamily="34" charset="0"/>
-                <a:ea typeface="Barlow"/>
-                <a:cs typeface="Arial" panose="020B0604020202020204" pitchFamily="34" charset="0"/>
-                <a:sym typeface="Barlow"/>
-              </a:rPr>
-              <a:t>Poleche</a:t>
-            </a:r>
-            <a:r>
-              <a:rPr lang="es-CO" sz="4400" b="0" i="0" u="none" strike="noStrike" cap="none" dirty="0">
-                <a:solidFill>
-                  <a:srgbClr val="000000"/>
-                </a:solidFill>
-                <a:latin typeface="Arial" panose="020B0604020202020204" pitchFamily="34" charset="0"/>
-                <a:ea typeface="Barlow"/>
-                <a:cs typeface="Arial" panose="020B0604020202020204" pitchFamily="34" charset="0"/>
-                <a:sym typeface="Barlow"/>
-              </a:rPr>
-              <a:t/>
+              <a:t>Jhony alexander Poloche</a:t>
             </a:r>
             <a:br>
               <a:rPr lang="es-CO" sz="4400" b="0" i="0" u="none" strike="noStrike" cap="none" dirty="0">
@@ -7031,18 +6714,6 @@
               </a:rPr>
               <a:t>Paula Alejandra Garnica</a:t>
             </a:r>
-            <a:r>
-              <a:rPr lang="es-CO" sz="4400" b="0" i="0" u="none" strike="noStrike" cap="none" dirty="0">
-                <a:solidFill>
-                  <a:srgbClr val="000000"/>
-                </a:solidFill>
-                <a:latin typeface="Arial" panose="020B0604020202020204" pitchFamily="34" charset="0"/>
-                <a:ea typeface="Barlow"/>
-                <a:cs typeface="Arial" panose="020B0604020202020204" pitchFamily="34" charset="0"/>
-                <a:sym typeface="Barlow"/>
-              </a:rPr>
-              <a:t/>
-            </a:r>
             <a:br>
               <a:rPr lang="es-CO" sz="4400" b="0" i="0" u="none" strike="noStrike" cap="none" dirty="0">
                 <a:solidFill>
@@ -7230,18 +6901,6 @@
                 <a:sym typeface="Barlow"/>
               </a:rPr>
               <a:t> Quiroga</a:t>
-            </a:r>
-            <a:r>
-              <a:rPr lang="es-CO" sz="4800" b="0" i="0" u="none" strike="noStrike" cap="none" dirty="0">
-                <a:solidFill>
-                  <a:srgbClr val="000000"/>
-                </a:solidFill>
-                <a:latin typeface="Arial" panose="020B0604020202020204" pitchFamily="34" charset="0"/>
-                <a:ea typeface="Barlow"/>
-                <a:cs typeface="Arial" panose="020B0604020202020204" pitchFamily="34" charset="0"/>
-                <a:sym typeface="Barlow"/>
-              </a:rPr>
-              <a:t/>
             </a:r>
             <a:br>
               <a:rPr lang="es-CO" sz="4800" b="0" i="0" u="none" strike="noStrike" cap="none" dirty="0">
@@ -7440,14 +7099,14 @@
               <a:tabLst/>
             </a:pPr>
             <a:r>
-              <a:rPr lang="es-CO" sz="19900" dirty="0" smtClean="0">
+              <a:rPr lang="es-CO" sz="19900" dirty="0">
                 <a:latin typeface="Arial" panose="020B0604020202020204" pitchFamily="34" charset="0"/>
                 <a:cs typeface="Arial" panose="020B0604020202020204" pitchFamily="34" charset="0"/>
               </a:rPr>
               <a:t>GRACIAS</a:t>
             </a:r>
             <a:r>
-              <a:rPr lang="es-CO" dirty="0" smtClean="0"/>
+              <a:rPr lang="es-CO" dirty="0"/>
               <a:t> </a:t>
             </a:r>
             <a:endParaRPr kumimoji="0" lang="es-CO" sz="3600" b="1" i="0" u="none" strike="noStrike" cap="none" spc="0" normalizeH="0" baseline="0" dirty="0">
@@ -7555,27 +7214,7 @@
                 <a:latin typeface="Arial" panose="020B0604020202020204" pitchFamily="34" charset="0"/>
                 <a:cs typeface="Arial" panose="020B0604020202020204" pitchFamily="34" charset="0"/>
               </a:rPr>
-              <a:t>Cómo se puede hacer para que el control del inventario que lleva la microempresa en este momento, mejore y  </a:t>
-            </a:r>
-            <a:r>
-              <a:rPr lang="es-ES" dirty="0" smtClean="0">
-                <a:solidFill>
-                  <a:schemeClr val="bg1"/>
-                </a:solidFill>
-                <a:latin typeface="Arial" panose="020B0604020202020204" pitchFamily="34" charset="0"/>
-                <a:cs typeface="Arial" panose="020B0604020202020204" pitchFamily="34" charset="0"/>
-              </a:rPr>
-              <a:t>así </a:t>
-            </a:r>
-            <a:r>
-              <a:rPr lang="es-ES" dirty="0">
-                <a:solidFill>
-                  <a:schemeClr val="bg1"/>
-                </a:solidFill>
-                <a:latin typeface="Arial" panose="020B0604020202020204" pitchFamily="34" charset="0"/>
-                <a:cs typeface="Arial" panose="020B0604020202020204" pitchFamily="34" charset="0"/>
-              </a:rPr>
-              <a:t>se lleve un mejor rendimiento en la utilización de sus productos?</a:t>
+              <a:t>Cómo se puede hacer para que el control del inventario que lleva la microempresa en este momento, mejore y  así se lleve un mejor rendimiento en la utilización de sus productos?</a:t>
             </a:r>
           </a:p>
         </p:txBody>
@@ -7625,13 +7264,6 @@
     <a:masterClrMapping/>
   </p:clrMapOvr>
   <p:transition spd="med"/>
-  <p:timing>
-    <p:tnLst>
-      <p:par>
-        <p:cTn id="1" dur="indefinite" restart="never" nodeType="tmRoot"/>
-      </p:par>
-    </p:tnLst>
-  </p:timing>
 </p:sld>
 </file>
 
@@ -7685,24 +7317,14 @@
           <a:lstStyle/>
           <a:p>
             <a:r>
-              <a:rPr lang="es-CO" sz="5400" dirty="0" smtClean="0">
+              <a:rPr lang="es-CO" sz="5400" dirty="0">
                 <a:solidFill>
                   <a:schemeClr val="bg1"/>
                 </a:solidFill>
                 <a:latin typeface="Arial" panose="020B0604020202020204" pitchFamily="34" charset="0"/>
                 <a:cs typeface="Arial" panose="020B0604020202020204" pitchFamily="34" charset="0"/>
               </a:rPr>
-              <a:t>3. </a:t>
-            </a:r>
-            <a:r>
-              <a:rPr lang="es-CO" sz="5400" dirty="0">
-                <a:solidFill>
-                  <a:schemeClr val="bg1"/>
-                </a:solidFill>
-                <a:latin typeface="Arial" panose="020B0604020202020204" pitchFamily="34" charset="0"/>
-                <a:cs typeface="Arial" panose="020B0604020202020204" pitchFamily="34" charset="0"/>
-              </a:rPr>
-              <a:t>Objetivo General :</a:t>
+              <a:t>3. Objetivo General :</a:t>
             </a:r>
           </a:p>
         </p:txBody>
@@ -7780,13 +7402,6 @@
     <a:masterClrMapping/>
   </p:clrMapOvr>
   <p:transition spd="med"/>
-  <p:timing>
-    <p:tnLst>
-      <p:par>
-        <p:cTn id="1" dur="indefinite" restart="never" nodeType="tmRoot"/>
-      </p:par>
-    </p:tnLst>
-  </p:timing>
 </p:sld>
 </file>
 
@@ -7840,24 +7455,14 @@
           <a:lstStyle/>
           <a:p>
             <a:r>
-              <a:rPr lang="es-CO" sz="5400" dirty="0" smtClean="0">
+              <a:rPr lang="es-CO" sz="5400" dirty="0">
                 <a:solidFill>
                   <a:schemeClr val="bg1"/>
                 </a:solidFill>
                 <a:latin typeface="Arial" panose="020B0604020202020204" pitchFamily="34" charset="0"/>
                 <a:cs typeface="Arial" panose="020B0604020202020204" pitchFamily="34" charset="0"/>
               </a:rPr>
-              <a:t>4. </a:t>
-            </a:r>
-            <a:r>
-              <a:rPr lang="es-CO" sz="5400" dirty="0">
-                <a:solidFill>
-                  <a:schemeClr val="bg1"/>
-                </a:solidFill>
-                <a:latin typeface="Arial" panose="020B0604020202020204" pitchFamily="34" charset="0"/>
-                <a:cs typeface="Arial" panose="020B0604020202020204" pitchFamily="34" charset="0"/>
-              </a:rPr>
-              <a:t>Objetivos Específicos:</a:t>
+              <a:t>4. Objetivos Específicos:</a:t>
             </a:r>
           </a:p>
         </p:txBody>
@@ -7957,13 +7562,6 @@
     <a:masterClrMapping/>
   </p:clrMapOvr>
   <p:transition spd="med"/>
-  <p:timing>
-    <p:tnLst>
-      <p:par>
-        <p:cTn id="1" dur="indefinite" restart="never" nodeType="tmRoot"/>
-      </p:par>
-    </p:tnLst>
-  </p:timing>
 </p:sld>
 </file>
 
@@ -8017,24 +7615,14 @@
           <a:lstStyle/>
           <a:p>
             <a:r>
-              <a:rPr lang="es-CO" sz="5400" dirty="0" smtClean="0">
+              <a:rPr lang="es-CO" sz="5400" dirty="0">
                 <a:solidFill>
                   <a:schemeClr val="bg1"/>
                 </a:solidFill>
                 <a:latin typeface="Arial" panose="020B0604020202020204" pitchFamily="34" charset="0"/>
                 <a:cs typeface="Arial" panose="020B0604020202020204" pitchFamily="34" charset="0"/>
               </a:rPr>
-              <a:t>5. </a:t>
-            </a:r>
-            <a:r>
-              <a:rPr lang="es-CO" sz="5400" dirty="0">
-                <a:solidFill>
-                  <a:schemeClr val="bg1"/>
-                </a:solidFill>
-                <a:latin typeface="Arial" panose="020B0604020202020204" pitchFamily="34" charset="0"/>
-                <a:cs typeface="Arial" panose="020B0604020202020204" pitchFamily="34" charset="0"/>
-              </a:rPr>
-              <a:t>Justificación :</a:t>
+              <a:t>5. Justificación :</a:t>
             </a:r>
           </a:p>
         </p:txBody>
@@ -8131,13 +7719,6 @@
     <a:masterClrMapping/>
   </p:clrMapOvr>
   <p:transition spd="med"/>
-  <p:timing>
-    <p:tnLst>
-      <p:par>
-        <p:cTn id="1" dur="indefinite" restart="never" nodeType="tmRoot"/>
-      </p:par>
-    </p:tnLst>
-  </p:timing>
 </p:sld>
 </file>
 
@@ -8191,24 +7772,14 @@
           <a:lstStyle/>
           <a:p>
             <a:r>
-              <a:rPr lang="es-CO" sz="5400" dirty="0" smtClean="0">
+              <a:rPr lang="es-CO" sz="5400" dirty="0">
                 <a:solidFill>
                   <a:schemeClr val="bg1"/>
                 </a:solidFill>
                 <a:latin typeface="Arial" panose="020B0604020202020204" pitchFamily="34" charset="0"/>
                 <a:cs typeface="Arial" panose="020B0604020202020204" pitchFamily="34" charset="0"/>
               </a:rPr>
-              <a:t>6. </a:t>
-            </a:r>
-            <a:r>
-              <a:rPr lang="es-CO" sz="5400" dirty="0">
-                <a:solidFill>
-                  <a:schemeClr val="bg1"/>
-                </a:solidFill>
-                <a:latin typeface="Arial" panose="020B0604020202020204" pitchFamily="34" charset="0"/>
-                <a:cs typeface="Arial" panose="020B0604020202020204" pitchFamily="34" charset="0"/>
-              </a:rPr>
-              <a:t>Alcance </a:t>
+              <a:t>6. Alcance </a:t>
             </a:r>
           </a:p>
         </p:txBody>
@@ -8325,13 +7896,6 @@
     <a:masterClrMapping/>
   </p:clrMapOvr>
   <p:transition spd="med"/>
-  <p:timing>
-    <p:tnLst>
-      <p:par>
-        <p:cTn id="1" dur="indefinite" restart="never" nodeType="tmRoot"/>
-      </p:par>
-    </p:tnLst>
-  </p:timing>
 </p:sld>
 </file>
 
@@ -8385,24 +7949,14 @@
           <a:lstStyle/>
           <a:p>
             <a:r>
-              <a:rPr lang="es-CO" sz="5400" dirty="0" smtClean="0">
+              <a:rPr lang="es-CO" sz="5400" dirty="0">
                 <a:solidFill>
                   <a:schemeClr val="bg1"/>
                 </a:solidFill>
                 <a:latin typeface="Arial" panose="020B0604020202020204" pitchFamily="34" charset="0"/>
                 <a:cs typeface="Arial" panose="020B0604020202020204" pitchFamily="34" charset="0"/>
               </a:rPr>
-              <a:t>7. </a:t>
-            </a:r>
-            <a:r>
-              <a:rPr lang="es-CO" sz="5400" dirty="0">
-                <a:solidFill>
-                  <a:schemeClr val="bg1"/>
-                </a:solidFill>
-                <a:latin typeface="Arial" panose="020B0604020202020204" pitchFamily="34" charset="0"/>
-                <a:cs typeface="Arial" panose="020B0604020202020204" pitchFamily="34" charset="0"/>
-              </a:rPr>
-              <a:t>Delimitación : </a:t>
+              <a:t>7. Delimitación : </a:t>
             </a:r>
           </a:p>
         </p:txBody>
@@ -8565,13 +8119,6 @@
     <a:masterClrMapping/>
   </p:clrMapOvr>
   <p:transition spd="med"/>
-  <p:timing>
-    <p:tnLst>
-      <p:par>
-        <p:cTn id="1" dur="indefinite" restart="never" nodeType="tmRoot"/>
-      </p:par>
-    </p:tnLst>
-  </p:timing>
 </p:sld>
 </file>
 

</xml_diff>